<commit_message>
Add functionality to create PowerPoint and Word documents from comparison plots and optimization results in run_code.py. Update output filename base for optimization results. Include new binary files for optimization summary and format.
</commit_message>
<xml_diff>
--- a/main/Data/format.pptx
+++ b/main/Data/format.pptx
@@ -261,7 +261,7 @@
           <a:p>
             <a:fld id="{AEDED9CB-438B-4D80-B783-127781764CD7}" type="datetimeFigureOut">
               <a:rPr lang="he-IL" smtClean="0"/>
-              <a:t>כ"ג/אלול/תשפ"ה</a:t>
+              <a:t>י"א/חשון/תשפ"ו</a:t>
             </a:fld>
             <a:endParaRPr lang="he-IL"/>
           </a:p>
@@ -461,7 +461,7 @@
           <a:p>
             <a:fld id="{AEDED9CB-438B-4D80-B783-127781764CD7}" type="datetimeFigureOut">
               <a:rPr lang="he-IL" smtClean="0"/>
-              <a:t>כ"ג/אלול/תשפ"ה</a:t>
+              <a:t>י"א/חשון/תשפ"ו</a:t>
             </a:fld>
             <a:endParaRPr lang="he-IL"/>
           </a:p>
@@ -671,7 +671,7 @@
           <a:p>
             <a:fld id="{AEDED9CB-438B-4D80-B783-127781764CD7}" type="datetimeFigureOut">
               <a:rPr lang="he-IL" smtClean="0"/>
-              <a:t>כ"ג/אלול/תשפ"ה</a:t>
+              <a:t>י"א/חשון/תשפ"ו</a:t>
             </a:fld>
             <a:endParaRPr lang="he-IL"/>
           </a:p>
@@ -871,7 +871,7 @@
           <a:p>
             <a:fld id="{AEDED9CB-438B-4D80-B783-127781764CD7}" type="datetimeFigureOut">
               <a:rPr lang="he-IL" smtClean="0"/>
-              <a:t>כ"ג/אלול/תשפ"ה</a:t>
+              <a:t>י"א/חשון/תשפ"ו</a:t>
             </a:fld>
             <a:endParaRPr lang="he-IL"/>
           </a:p>
@@ -1147,7 +1147,7 @@
           <a:p>
             <a:fld id="{AEDED9CB-438B-4D80-B783-127781764CD7}" type="datetimeFigureOut">
               <a:rPr lang="he-IL" smtClean="0"/>
-              <a:t>כ"ג/אלול/תשפ"ה</a:t>
+              <a:t>י"א/חשון/תשפ"ו</a:t>
             </a:fld>
             <a:endParaRPr lang="he-IL"/>
           </a:p>
@@ -1415,7 +1415,7 @@
           <a:p>
             <a:fld id="{AEDED9CB-438B-4D80-B783-127781764CD7}" type="datetimeFigureOut">
               <a:rPr lang="he-IL" smtClean="0"/>
-              <a:t>כ"ג/אלול/תשפ"ה</a:t>
+              <a:t>י"א/חשון/תשפ"ו</a:t>
             </a:fld>
             <a:endParaRPr lang="he-IL"/>
           </a:p>
@@ -1830,7 +1830,7 @@
           <a:p>
             <a:fld id="{AEDED9CB-438B-4D80-B783-127781764CD7}" type="datetimeFigureOut">
               <a:rPr lang="he-IL" smtClean="0"/>
-              <a:t>כ"ג/אלול/תשפ"ה</a:t>
+              <a:t>י"א/חשון/תשפ"ו</a:t>
             </a:fld>
             <a:endParaRPr lang="he-IL"/>
           </a:p>
@@ -1972,7 +1972,7 @@
           <a:p>
             <a:fld id="{AEDED9CB-438B-4D80-B783-127781764CD7}" type="datetimeFigureOut">
               <a:rPr lang="he-IL" smtClean="0"/>
-              <a:t>כ"ג/אלול/תשפ"ה</a:t>
+              <a:t>י"א/חשון/תשפ"ו</a:t>
             </a:fld>
             <a:endParaRPr lang="he-IL"/>
           </a:p>
@@ -2085,7 +2085,7 @@
           <a:p>
             <a:fld id="{AEDED9CB-438B-4D80-B783-127781764CD7}" type="datetimeFigureOut">
               <a:rPr lang="he-IL" smtClean="0"/>
-              <a:t>כ"ג/אלול/תשפ"ה</a:t>
+              <a:t>י"א/חשון/תשפ"ו</a:t>
             </a:fld>
             <a:endParaRPr lang="he-IL"/>
           </a:p>
@@ -2398,7 +2398,7 @@
           <a:p>
             <a:fld id="{AEDED9CB-438B-4D80-B783-127781764CD7}" type="datetimeFigureOut">
               <a:rPr lang="he-IL" smtClean="0"/>
-              <a:t>כ"ג/אלול/תשפ"ה</a:t>
+              <a:t>י"א/חשון/תשפ"ו</a:t>
             </a:fld>
             <a:endParaRPr lang="he-IL"/>
           </a:p>
@@ -2687,7 +2687,7 @@
           <a:p>
             <a:fld id="{AEDED9CB-438B-4D80-B783-127781764CD7}" type="datetimeFigureOut">
               <a:rPr lang="he-IL" smtClean="0"/>
-              <a:t>כ"ג/אלול/תשפ"ה</a:t>
+              <a:t>י"א/חשון/תשפ"ו</a:t>
             </a:fld>
             <a:endParaRPr lang="he-IL"/>
           </a:p>
@@ -2930,7 +2930,7 @@
           <a:p>
             <a:fld id="{AEDED9CB-438B-4D80-B783-127781764CD7}" type="datetimeFigureOut">
               <a:rPr lang="he-IL" smtClean="0"/>
-              <a:t>כ"ג/אלול/תשפ"ה</a:t>
+              <a:t>י"א/חשון/תשפ"ו</a:t>
             </a:fld>
             <a:endParaRPr lang="he-IL"/>
           </a:p>
@@ -3465,8 +3465,8 @@
         </p:nvSpPr>
         <p:spPr>
           <a:xfrm>
-            <a:off x="8273142" y="0"/>
-            <a:ext cx="3918858" cy="979715"/>
+            <a:off x="2862943" y="0"/>
+            <a:ext cx="9329057" cy="979715"/>
           </a:xfrm>
         </p:spPr>
         <p:txBody>
@@ -3475,6 +3475,7 @@
           </a:bodyPr>
           <a:lstStyle/>
           <a:p>
+            <a:pPr algn="r"/>
             <a:r>
               <a:rPr lang="en-US" dirty="0"/>
               <a:t>A title</a:t>

</xml_diff>